<commit_message>
Zustandsmaschine mit den Ereignissen Timer | Störung ergänzt
</commit_message>
<xml_diff>
--- a/SW/15_Zustandsmaschine/Zustandsuebergangsdiagramm.pptx
+++ b/SW/15_Zustandsmaschine/Zustandsuebergangsdiagramm.pptx
@@ -4,8 +4,12 @@
   <p:sldMasterIdLst>
     <p:sldMasterId id="2147483648" r:id="rId1"/>
   </p:sldMasterIdLst>
+  <p:notesMasterIdLst>
+    <p:notesMasterId r:id="rId4"/>
+  </p:notesMasterIdLst>
   <p:sldIdLst>
     <p:sldId id="257" r:id="rId2"/>
+    <p:sldId id="258" r:id="rId3"/>
   </p:sldIdLst>
   <p:sldSz cx="12192000" cy="6858000"/>
   <p:notesSz cx="6858000" cy="9144000"/>
@@ -112,6 +116,355 @@
 </p:presentation>
 </file>
 
+<file path=ppt/notesMasters/notesMaster1.xml><?xml version="1.0" encoding="utf-8"?>
+<p:notesMaster xmlns:a="http://schemas.openxmlformats.org/drawingml/2006/main" xmlns:r="http://schemas.openxmlformats.org/officeDocument/2006/relationships" xmlns:p="http://schemas.openxmlformats.org/presentationml/2006/main">
+  <p:cSld>
+    <p:bg>
+      <p:bgRef idx="1001">
+        <a:schemeClr val="bg1"/>
+      </p:bgRef>
+    </p:bg>
+    <p:spTree>
+      <p:nvGrpSpPr>
+        <p:cNvPr id="1" name=""/>
+        <p:cNvGrpSpPr/>
+        <p:nvPr/>
+      </p:nvGrpSpPr>
+      <p:grpSpPr>
+        <a:xfrm>
+          <a:off x="0" y="0"/>
+          <a:ext cx="0" cy="0"/>
+          <a:chOff x="0" y="0"/>
+          <a:chExt cx="0" cy="0"/>
+        </a:xfrm>
+      </p:grpSpPr>
+      <p:sp>
+        <p:nvSpPr>
+          <p:cNvPr id="2" name="Kopfzeilenplatzhalter 1"/>
+          <p:cNvSpPr>
+            <a:spLocks noGrp="1"/>
+          </p:cNvSpPr>
+          <p:nvPr>
+            <p:ph type="hdr" sz="quarter"/>
+          </p:nvPr>
+        </p:nvSpPr>
+        <p:spPr>
+          <a:xfrm>
+            <a:off x="0" y="0"/>
+            <a:ext cx="2971800" cy="458788"/>
+          </a:xfrm>
+          <a:prstGeom prst="rect">
+            <a:avLst/>
+          </a:prstGeom>
+        </p:spPr>
+        <p:txBody>
+          <a:bodyPr vert="horz" lIns="91440" tIns="45720" rIns="91440" bIns="45720" rtlCol="0"/>
+          <a:lstStyle>
+            <a:lvl1pPr algn="l">
+              <a:defRPr sz="1200"/>
+            </a:lvl1pPr>
+          </a:lstStyle>
+          <a:p>
+            <a:endParaRPr lang="de-DE"/>
+          </a:p>
+        </p:txBody>
+      </p:sp>
+      <p:sp>
+        <p:nvSpPr>
+          <p:cNvPr id="3" name="Datumsplatzhalter 2"/>
+          <p:cNvSpPr>
+            <a:spLocks noGrp="1"/>
+          </p:cNvSpPr>
+          <p:nvPr>
+            <p:ph type="dt" idx="1"/>
+          </p:nvPr>
+        </p:nvSpPr>
+        <p:spPr>
+          <a:xfrm>
+            <a:off x="3884613" y="0"/>
+            <a:ext cx="2971800" cy="458788"/>
+          </a:xfrm>
+          <a:prstGeom prst="rect">
+            <a:avLst/>
+          </a:prstGeom>
+        </p:spPr>
+        <p:txBody>
+          <a:bodyPr vert="horz" lIns="91440" tIns="45720" rIns="91440" bIns="45720" rtlCol="0"/>
+          <a:lstStyle>
+            <a:lvl1pPr algn="r">
+              <a:defRPr sz="1200"/>
+            </a:lvl1pPr>
+          </a:lstStyle>
+          <a:p>
+            <a:fld id="{25D6A29E-E3C1-4215-9F88-D7C0283169B9}" type="datetimeFigureOut">
+              <a:rPr lang="de-DE" smtClean="0"/>
+              <a:t>18.01.2024</a:t>
+            </a:fld>
+            <a:endParaRPr lang="de-DE"/>
+          </a:p>
+        </p:txBody>
+      </p:sp>
+      <p:sp>
+        <p:nvSpPr>
+          <p:cNvPr id="4" name="Folienbildplatzhalter 3"/>
+          <p:cNvSpPr>
+            <a:spLocks noGrp="1" noRot="1" noChangeAspect="1"/>
+          </p:cNvSpPr>
+          <p:nvPr>
+            <p:ph type="sldImg" idx="2"/>
+          </p:nvPr>
+        </p:nvSpPr>
+        <p:spPr>
+          <a:xfrm>
+            <a:off x="685800" y="1143000"/>
+            <a:ext cx="5486400" cy="3086100"/>
+          </a:xfrm>
+          <a:prstGeom prst="rect">
+            <a:avLst/>
+          </a:prstGeom>
+          <a:noFill/>
+          <a:ln w="12700">
+            <a:solidFill>
+              <a:prstClr val="black"/>
+            </a:solidFill>
+          </a:ln>
+        </p:spPr>
+        <p:txBody>
+          <a:bodyPr vert="horz" lIns="91440" tIns="45720" rIns="91440" bIns="45720" rtlCol="0" anchor="ctr"/>
+          <a:lstStyle/>
+          <a:p>
+            <a:endParaRPr lang="de-DE"/>
+          </a:p>
+        </p:txBody>
+      </p:sp>
+      <p:sp>
+        <p:nvSpPr>
+          <p:cNvPr id="5" name="Notizenplatzhalter 4"/>
+          <p:cNvSpPr>
+            <a:spLocks noGrp="1"/>
+          </p:cNvSpPr>
+          <p:nvPr>
+            <p:ph type="body" sz="quarter" idx="3"/>
+          </p:nvPr>
+        </p:nvSpPr>
+        <p:spPr>
+          <a:xfrm>
+            <a:off x="685800" y="4400550"/>
+            <a:ext cx="5486400" cy="3600450"/>
+          </a:xfrm>
+          <a:prstGeom prst="rect">
+            <a:avLst/>
+          </a:prstGeom>
+        </p:spPr>
+        <p:txBody>
+          <a:bodyPr vert="horz" lIns="91440" tIns="45720" rIns="91440" bIns="45720" rtlCol="0"/>
+          <a:lstStyle/>
+          <a:p>
+            <a:pPr lvl="0"/>
+            <a:r>
+              <a:rPr lang="de-DE"/>
+              <a:t>Mastertextformat bearbeiten</a:t>
+            </a:r>
+          </a:p>
+          <a:p>
+            <a:pPr lvl="1"/>
+            <a:r>
+              <a:rPr lang="de-DE"/>
+              <a:t>Zweite Ebene</a:t>
+            </a:r>
+          </a:p>
+          <a:p>
+            <a:pPr lvl="2"/>
+            <a:r>
+              <a:rPr lang="de-DE"/>
+              <a:t>Dritte Ebene</a:t>
+            </a:r>
+          </a:p>
+          <a:p>
+            <a:pPr lvl="3"/>
+            <a:r>
+              <a:rPr lang="de-DE"/>
+              <a:t>Vierte Ebene</a:t>
+            </a:r>
+          </a:p>
+          <a:p>
+            <a:pPr lvl="4"/>
+            <a:r>
+              <a:rPr lang="de-DE"/>
+              <a:t>Fünfte Ebene</a:t>
+            </a:r>
+          </a:p>
+        </p:txBody>
+      </p:sp>
+      <p:sp>
+        <p:nvSpPr>
+          <p:cNvPr id="6" name="Fußzeilenplatzhalter 5"/>
+          <p:cNvSpPr>
+            <a:spLocks noGrp="1"/>
+          </p:cNvSpPr>
+          <p:nvPr>
+            <p:ph type="ftr" sz="quarter" idx="4"/>
+          </p:nvPr>
+        </p:nvSpPr>
+        <p:spPr>
+          <a:xfrm>
+            <a:off x="0" y="8685213"/>
+            <a:ext cx="2971800" cy="458787"/>
+          </a:xfrm>
+          <a:prstGeom prst="rect">
+            <a:avLst/>
+          </a:prstGeom>
+        </p:spPr>
+        <p:txBody>
+          <a:bodyPr vert="horz" lIns="91440" tIns="45720" rIns="91440" bIns="45720" rtlCol="0" anchor="b"/>
+          <a:lstStyle>
+            <a:lvl1pPr algn="l">
+              <a:defRPr sz="1200"/>
+            </a:lvl1pPr>
+          </a:lstStyle>
+          <a:p>
+            <a:endParaRPr lang="de-DE"/>
+          </a:p>
+        </p:txBody>
+      </p:sp>
+      <p:sp>
+        <p:nvSpPr>
+          <p:cNvPr id="7" name="Foliennummernplatzhalter 6"/>
+          <p:cNvSpPr>
+            <a:spLocks noGrp="1"/>
+          </p:cNvSpPr>
+          <p:nvPr>
+            <p:ph type="sldNum" sz="quarter" idx="5"/>
+          </p:nvPr>
+        </p:nvSpPr>
+        <p:spPr>
+          <a:xfrm>
+            <a:off x="3884613" y="8685213"/>
+            <a:ext cx="2971800" cy="458787"/>
+          </a:xfrm>
+          <a:prstGeom prst="rect">
+            <a:avLst/>
+          </a:prstGeom>
+        </p:spPr>
+        <p:txBody>
+          <a:bodyPr vert="horz" lIns="91440" tIns="45720" rIns="91440" bIns="45720" rtlCol="0" anchor="b"/>
+          <a:lstStyle>
+            <a:lvl1pPr algn="r">
+              <a:defRPr sz="1200"/>
+            </a:lvl1pPr>
+          </a:lstStyle>
+          <a:p>
+            <a:fld id="{602E757D-DBE4-4D2C-9655-191599DDAEB7}" type="slidenum">
+              <a:rPr lang="de-DE" smtClean="0"/>
+              <a:t>‹Nr.›</a:t>
+            </a:fld>
+            <a:endParaRPr lang="de-DE"/>
+          </a:p>
+        </p:txBody>
+      </p:sp>
+    </p:spTree>
+    <p:extLst>
+      <p:ext uri="{BB962C8B-B14F-4D97-AF65-F5344CB8AC3E}">
+        <p14:creationId xmlns:p14="http://schemas.microsoft.com/office/powerpoint/2010/main" val="1709580337"/>
+      </p:ext>
+    </p:extLst>
+  </p:cSld>
+  <p:clrMap bg1="lt1" tx1="dk1" bg2="lt2" tx2="dk2" accent1="accent1" accent2="accent2" accent3="accent3" accent4="accent4" accent5="accent5" accent6="accent6" hlink="hlink" folHlink="folHlink"/>
+  <p:notesStyle>
+    <a:lvl1pPr marL="0" algn="l" defTabSz="914400" rtl="0" eaLnBrk="1" latinLnBrk="0" hangingPunct="1">
+      <a:defRPr sz="1200" kern="1200">
+        <a:solidFill>
+          <a:schemeClr val="tx1"/>
+        </a:solidFill>
+        <a:latin typeface="+mn-lt"/>
+        <a:ea typeface="+mn-ea"/>
+        <a:cs typeface="+mn-cs"/>
+      </a:defRPr>
+    </a:lvl1pPr>
+    <a:lvl2pPr marL="457200" algn="l" defTabSz="914400" rtl="0" eaLnBrk="1" latinLnBrk="0" hangingPunct="1">
+      <a:defRPr sz="1200" kern="1200">
+        <a:solidFill>
+          <a:schemeClr val="tx1"/>
+        </a:solidFill>
+        <a:latin typeface="+mn-lt"/>
+        <a:ea typeface="+mn-ea"/>
+        <a:cs typeface="+mn-cs"/>
+      </a:defRPr>
+    </a:lvl2pPr>
+    <a:lvl3pPr marL="914400" algn="l" defTabSz="914400" rtl="0" eaLnBrk="1" latinLnBrk="0" hangingPunct="1">
+      <a:defRPr sz="1200" kern="1200">
+        <a:solidFill>
+          <a:schemeClr val="tx1"/>
+        </a:solidFill>
+        <a:latin typeface="+mn-lt"/>
+        <a:ea typeface="+mn-ea"/>
+        <a:cs typeface="+mn-cs"/>
+      </a:defRPr>
+    </a:lvl3pPr>
+    <a:lvl4pPr marL="1371600" algn="l" defTabSz="914400" rtl="0" eaLnBrk="1" latinLnBrk="0" hangingPunct="1">
+      <a:defRPr sz="1200" kern="1200">
+        <a:solidFill>
+          <a:schemeClr val="tx1"/>
+        </a:solidFill>
+        <a:latin typeface="+mn-lt"/>
+        <a:ea typeface="+mn-ea"/>
+        <a:cs typeface="+mn-cs"/>
+      </a:defRPr>
+    </a:lvl4pPr>
+    <a:lvl5pPr marL="1828800" algn="l" defTabSz="914400" rtl="0" eaLnBrk="1" latinLnBrk="0" hangingPunct="1">
+      <a:defRPr sz="1200" kern="1200">
+        <a:solidFill>
+          <a:schemeClr val="tx1"/>
+        </a:solidFill>
+        <a:latin typeface="+mn-lt"/>
+        <a:ea typeface="+mn-ea"/>
+        <a:cs typeface="+mn-cs"/>
+      </a:defRPr>
+    </a:lvl5pPr>
+    <a:lvl6pPr marL="2286000" algn="l" defTabSz="914400" rtl="0" eaLnBrk="1" latinLnBrk="0" hangingPunct="1">
+      <a:defRPr sz="1200" kern="1200">
+        <a:solidFill>
+          <a:schemeClr val="tx1"/>
+        </a:solidFill>
+        <a:latin typeface="+mn-lt"/>
+        <a:ea typeface="+mn-ea"/>
+        <a:cs typeface="+mn-cs"/>
+      </a:defRPr>
+    </a:lvl6pPr>
+    <a:lvl7pPr marL="2743200" algn="l" defTabSz="914400" rtl="0" eaLnBrk="1" latinLnBrk="0" hangingPunct="1">
+      <a:defRPr sz="1200" kern="1200">
+        <a:solidFill>
+          <a:schemeClr val="tx1"/>
+        </a:solidFill>
+        <a:latin typeface="+mn-lt"/>
+        <a:ea typeface="+mn-ea"/>
+        <a:cs typeface="+mn-cs"/>
+      </a:defRPr>
+    </a:lvl7pPr>
+    <a:lvl8pPr marL="3200400" algn="l" defTabSz="914400" rtl="0" eaLnBrk="1" latinLnBrk="0" hangingPunct="1">
+      <a:defRPr sz="1200" kern="1200">
+        <a:solidFill>
+          <a:schemeClr val="tx1"/>
+        </a:solidFill>
+        <a:latin typeface="+mn-lt"/>
+        <a:ea typeface="+mn-ea"/>
+        <a:cs typeface="+mn-cs"/>
+      </a:defRPr>
+    </a:lvl8pPr>
+    <a:lvl9pPr marL="3657600" algn="l" defTabSz="914400" rtl="0" eaLnBrk="1" latinLnBrk="0" hangingPunct="1">
+      <a:defRPr sz="1200" kern="1200">
+        <a:solidFill>
+          <a:schemeClr val="tx1"/>
+        </a:solidFill>
+        <a:latin typeface="+mn-lt"/>
+        <a:ea typeface="+mn-ea"/>
+        <a:cs typeface="+mn-cs"/>
+      </a:defRPr>
+    </a:lvl9pPr>
+  </p:notesStyle>
+</p:notesMaster>
+</file>
+
 <file path=ppt/slideLayouts/slideLayout1.xml><?xml version="1.0" encoding="utf-8"?>
 <p:sldLayout xmlns:a="http://schemas.openxmlformats.org/drawingml/2006/main" xmlns:r="http://schemas.openxmlformats.org/officeDocument/2006/relationships" xmlns:p="http://schemas.openxmlformats.org/presentationml/2006/main" type="title" preserve="1">
   <p:cSld name="Titelfolie">
@@ -257,9 +610,9 @@
           <a:bodyPr/>
           <a:lstStyle/>
           <a:p>
-            <a:fld id="{29D93379-B5B7-4114-BC01-E7C239F6C97C}" type="datetimeFigureOut">
+            <a:fld id="{1FBA4CF5-501C-4735-B378-B1A00FF289D3}" type="datetime1">
               <a:rPr lang="de-DE" smtClean="0"/>
-              <a:t>04.12.2022</a:t>
+              <a:t>18.01.2024</a:t>
             </a:fld>
             <a:endParaRPr lang="de-DE"/>
           </a:p>
@@ -455,9 +808,9 @@
           <a:bodyPr/>
           <a:lstStyle/>
           <a:p>
-            <a:fld id="{29D93379-B5B7-4114-BC01-E7C239F6C97C}" type="datetimeFigureOut">
+            <a:fld id="{9AC32A24-D27A-480A-9567-75CDE0FF6904}" type="datetime1">
               <a:rPr lang="de-DE" smtClean="0"/>
-              <a:t>04.12.2022</a:t>
+              <a:t>18.01.2024</a:t>
             </a:fld>
             <a:endParaRPr lang="de-DE"/>
           </a:p>
@@ -663,9 +1016,9 @@
           <a:bodyPr/>
           <a:lstStyle/>
           <a:p>
-            <a:fld id="{29D93379-B5B7-4114-BC01-E7C239F6C97C}" type="datetimeFigureOut">
+            <a:fld id="{B0C6AB28-2F7D-4C38-AA00-B4F6F6D4B6EA}" type="datetime1">
               <a:rPr lang="de-DE" smtClean="0"/>
-              <a:t>04.12.2022</a:t>
+              <a:t>18.01.2024</a:t>
             </a:fld>
             <a:endParaRPr lang="de-DE"/>
           </a:p>
@@ -861,9 +1214,9 @@
           <a:bodyPr/>
           <a:lstStyle/>
           <a:p>
-            <a:fld id="{29D93379-B5B7-4114-BC01-E7C239F6C97C}" type="datetimeFigureOut">
+            <a:fld id="{4135A0BB-B387-484B-A440-B7DD98E69B8E}" type="datetime1">
               <a:rPr lang="de-DE" smtClean="0"/>
-              <a:t>04.12.2022</a:t>
+              <a:t>18.01.2024</a:t>
             </a:fld>
             <a:endParaRPr lang="de-DE"/>
           </a:p>
@@ -1136,9 +1489,9 @@
           <a:bodyPr/>
           <a:lstStyle/>
           <a:p>
-            <a:fld id="{29D93379-B5B7-4114-BC01-E7C239F6C97C}" type="datetimeFigureOut">
+            <a:fld id="{54304DA3-11FC-4009-92B7-EB4E13A27EED}" type="datetime1">
               <a:rPr lang="de-DE" smtClean="0"/>
-              <a:t>04.12.2022</a:t>
+              <a:t>18.01.2024</a:t>
             </a:fld>
             <a:endParaRPr lang="de-DE"/>
           </a:p>
@@ -1401,9 +1754,9 @@
           <a:bodyPr/>
           <a:lstStyle/>
           <a:p>
-            <a:fld id="{29D93379-B5B7-4114-BC01-E7C239F6C97C}" type="datetimeFigureOut">
+            <a:fld id="{ED194AA3-F8AF-4869-B3C3-034618A2BDDA}" type="datetime1">
               <a:rPr lang="de-DE" smtClean="0"/>
-              <a:t>04.12.2022</a:t>
+              <a:t>18.01.2024</a:t>
             </a:fld>
             <a:endParaRPr lang="de-DE"/>
           </a:p>
@@ -1813,9 +2166,9 @@
           <a:bodyPr/>
           <a:lstStyle/>
           <a:p>
-            <a:fld id="{29D93379-B5B7-4114-BC01-E7C239F6C97C}" type="datetimeFigureOut">
+            <a:fld id="{D9192334-642D-492C-B8AC-98A475EC3E0A}" type="datetime1">
               <a:rPr lang="de-DE" smtClean="0"/>
-              <a:t>04.12.2022</a:t>
+              <a:t>18.01.2024</a:t>
             </a:fld>
             <a:endParaRPr lang="de-DE"/>
           </a:p>
@@ -1954,9 +2307,9 @@
           <a:bodyPr/>
           <a:lstStyle/>
           <a:p>
-            <a:fld id="{29D93379-B5B7-4114-BC01-E7C239F6C97C}" type="datetimeFigureOut">
+            <a:fld id="{3252304D-1574-4651-A491-1193DC65D425}" type="datetime1">
               <a:rPr lang="de-DE" smtClean="0"/>
-              <a:t>04.12.2022</a:t>
+              <a:t>18.01.2024</a:t>
             </a:fld>
             <a:endParaRPr lang="de-DE"/>
           </a:p>
@@ -2067,9 +2420,9 @@
           <a:bodyPr/>
           <a:lstStyle/>
           <a:p>
-            <a:fld id="{29D93379-B5B7-4114-BC01-E7C239F6C97C}" type="datetimeFigureOut">
+            <a:fld id="{98DBB104-1925-49B3-AA0F-FA5A39EC44B9}" type="datetime1">
               <a:rPr lang="de-DE" smtClean="0"/>
-              <a:t>04.12.2022</a:t>
+              <a:t>18.01.2024</a:t>
             </a:fld>
             <a:endParaRPr lang="de-DE"/>
           </a:p>
@@ -2378,9 +2731,9 @@
           <a:bodyPr/>
           <a:lstStyle/>
           <a:p>
-            <a:fld id="{29D93379-B5B7-4114-BC01-E7C239F6C97C}" type="datetimeFigureOut">
+            <a:fld id="{CE8AA239-5323-42E1-B2D1-B793845E149A}" type="datetime1">
               <a:rPr lang="de-DE" smtClean="0"/>
-              <a:t>04.12.2022</a:t>
+              <a:t>18.01.2024</a:t>
             </a:fld>
             <a:endParaRPr lang="de-DE"/>
           </a:p>
@@ -2666,9 +3019,9 @@
           <a:bodyPr/>
           <a:lstStyle/>
           <a:p>
-            <a:fld id="{29D93379-B5B7-4114-BC01-E7C239F6C97C}" type="datetimeFigureOut">
+            <a:fld id="{57B83A55-C8DA-4F23-B5BC-2BE67BE77F6C}" type="datetime1">
               <a:rPr lang="de-DE" smtClean="0"/>
-              <a:t>04.12.2022</a:t>
+              <a:t>18.01.2024</a:t>
             </a:fld>
             <a:endParaRPr lang="de-DE"/>
           </a:p>
@@ -2907,9 +3260,9 @@
             </a:lvl1pPr>
           </a:lstStyle>
           <a:p>
-            <a:fld id="{29D93379-B5B7-4114-BC01-E7C239F6C97C}" type="datetimeFigureOut">
+            <a:fld id="{6D939E63-01FC-4C3D-BC01-B30490464AC6}" type="datetime1">
               <a:rPr lang="de-DE" smtClean="0"/>
-              <a:t>04.12.2022</a:t>
+              <a:t>18.01.2024</a:t>
             </a:fld>
             <a:endParaRPr lang="de-DE"/>
           </a:p>
@@ -3026,6 +3379,7 @@
     <p:sldLayoutId id="2147483658" r:id="rId10"/>
     <p:sldLayoutId id="2147483659" r:id="rId11"/>
   </p:sldLayoutIdLst>
+  <p:hf hdr="0" ftr="0" dt="0"/>
   <p:txStyles>
     <p:titleStyle>
       <a:lvl1pPr algn="l" defTabSz="914400" rtl="0" eaLnBrk="1" latinLnBrk="0" hangingPunct="1">
@@ -3768,6 +4122,1336 @@
             <a:lstStyle/>
             <a:p>
               <a:r>
+                <a:rPr lang="de-DE" sz="1400" dirty="0" err="1"/>
+                <a:t>Timer</a:t>
+              </a:r>
+              <a:endParaRPr lang="de-DE" sz="1400" dirty="0"/>
+            </a:p>
+          </p:txBody>
+        </p:sp>
+        <p:sp>
+          <p:nvSpPr>
+            <p:cNvPr id="51" name="Textfeld 50">
+              <a:extLst>
+                <a:ext uri="{FF2B5EF4-FFF2-40B4-BE49-F238E27FC236}">
+                  <a16:creationId xmlns:a16="http://schemas.microsoft.com/office/drawing/2014/main" id="{751F968C-92E0-CD64-A7D1-44959D9568E1}"/>
+                </a:ext>
+              </a:extLst>
+            </p:cNvPr>
+            <p:cNvSpPr txBox="1"/>
+            <p:nvPr/>
+          </p:nvSpPr>
+          <p:spPr>
+            <a:xfrm flipH="1">
+              <a:off x="5313137" y="2907786"/>
+              <a:ext cx="842046" cy="307777"/>
+            </a:xfrm>
+            <a:prstGeom prst="rect">
+              <a:avLst/>
+            </a:prstGeom>
+            <a:noFill/>
+          </p:spPr>
+          <p:txBody>
+            <a:bodyPr wrap="square" rtlCol="0">
+              <a:spAutoFit/>
+            </a:bodyPr>
+            <a:lstStyle/>
+            <a:p>
+              <a:r>
+                <a:rPr lang="de-DE" sz="1400" dirty="0" err="1"/>
+                <a:t>Timer</a:t>
+              </a:r>
+              <a:endParaRPr lang="de-DE" sz="1400" dirty="0"/>
+            </a:p>
+          </p:txBody>
+        </p:sp>
+        <p:sp>
+          <p:nvSpPr>
+            <p:cNvPr id="52" name="Textfeld 51">
+              <a:extLst>
+                <a:ext uri="{FF2B5EF4-FFF2-40B4-BE49-F238E27FC236}">
+                  <a16:creationId xmlns:a16="http://schemas.microsoft.com/office/drawing/2014/main" id="{458A3A03-43DE-A36E-B2C7-7856BD61BDE3}"/>
+                </a:ext>
+              </a:extLst>
+            </p:cNvPr>
+            <p:cNvSpPr txBox="1"/>
+            <p:nvPr/>
+          </p:nvSpPr>
+          <p:spPr>
+            <a:xfrm flipH="1">
+              <a:off x="5328598" y="3706666"/>
+              <a:ext cx="842046" cy="307777"/>
+            </a:xfrm>
+            <a:prstGeom prst="rect">
+              <a:avLst/>
+            </a:prstGeom>
+            <a:noFill/>
+          </p:spPr>
+          <p:txBody>
+            <a:bodyPr wrap="square" rtlCol="0">
+              <a:spAutoFit/>
+            </a:bodyPr>
+            <a:lstStyle/>
+            <a:p>
+              <a:r>
+                <a:rPr lang="de-DE" sz="1400" dirty="0" err="1"/>
+                <a:t>Timer</a:t>
+              </a:r>
+              <a:endParaRPr lang="de-DE" sz="1400" dirty="0"/>
+            </a:p>
+          </p:txBody>
+        </p:sp>
+        <p:sp>
+          <p:nvSpPr>
+            <p:cNvPr id="53" name="Textfeld 52">
+              <a:extLst>
+                <a:ext uri="{FF2B5EF4-FFF2-40B4-BE49-F238E27FC236}">
+                  <a16:creationId xmlns:a16="http://schemas.microsoft.com/office/drawing/2014/main" id="{F3F33812-B3F3-DF08-545F-FCC29408974A}"/>
+                </a:ext>
+              </a:extLst>
+            </p:cNvPr>
+            <p:cNvSpPr txBox="1"/>
+            <p:nvPr/>
+          </p:nvSpPr>
+          <p:spPr>
+            <a:xfrm flipH="1">
+              <a:off x="5328598" y="5440532"/>
+              <a:ext cx="842046" cy="307777"/>
+            </a:xfrm>
+            <a:prstGeom prst="rect">
+              <a:avLst/>
+            </a:prstGeom>
+            <a:noFill/>
+          </p:spPr>
+          <p:txBody>
+            <a:bodyPr wrap="square" rtlCol="0">
+              <a:spAutoFit/>
+            </a:bodyPr>
+            <a:lstStyle/>
+            <a:p>
+              <a:r>
+                <a:rPr lang="de-DE" sz="1400" dirty="0" err="1"/>
+                <a:t>Timer</a:t>
+              </a:r>
+              <a:endParaRPr lang="de-DE" sz="1400" dirty="0"/>
+            </a:p>
+          </p:txBody>
+        </p:sp>
+        <p:sp>
+          <p:nvSpPr>
+            <p:cNvPr id="54" name="Textfeld 53">
+              <a:extLst>
+                <a:ext uri="{FF2B5EF4-FFF2-40B4-BE49-F238E27FC236}">
+                  <a16:creationId xmlns:a16="http://schemas.microsoft.com/office/drawing/2014/main" id="{4B3C7C8D-4A08-0335-A5F2-33863BAC29B0}"/>
+                </a:ext>
+              </a:extLst>
+            </p:cNvPr>
+            <p:cNvSpPr txBox="1"/>
+            <p:nvPr/>
+          </p:nvSpPr>
+          <p:spPr>
+            <a:xfrm flipH="1">
+              <a:off x="5328598" y="4491166"/>
+              <a:ext cx="842046" cy="307777"/>
+            </a:xfrm>
+            <a:prstGeom prst="rect">
+              <a:avLst/>
+            </a:prstGeom>
+            <a:noFill/>
+          </p:spPr>
+          <p:txBody>
+            <a:bodyPr wrap="square" rtlCol="0">
+              <a:spAutoFit/>
+            </a:bodyPr>
+            <a:lstStyle/>
+            <a:p>
+              <a:r>
+                <a:rPr lang="de-DE" sz="1400" dirty="0" err="1"/>
+                <a:t>Timer</a:t>
+              </a:r>
+              <a:endParaRPr lang="de-DE" sz="1400" dirty="0"/>
+            </a:p>
+          </p:txBody>
+        </p:sp>
+        <p:cxnSp>
+          <p:nvCxnSpPr>
+            <p:cNvPr id="58" name="Verbinder: gewinkelt 57">
+              <a:extLst>
+                <a:ext uri="{FF2B5EF4-FFF2-40B4-BE49-F238E27FC236}">
+                  <a16:creationId xmlns:a16="http://schemas.microsoft.com/office/drawing/2014/main" id="{F1EDAF7A-5C93-59C2-989E-4CD75940FEC5}"/>
+                </a:ext>
+              </a:extLst>
+            </p:cNvPr>
+            <p:cNvCxnSpPr>
+              <a:cxnSpLocks/>
+            </p:cNvCxnSpPr>
+            <p:nvPr/>
+          </p:nvCxnSpPr>
+          <p:spPr>
+            <a:xfrm rot="5400000" flipH="1" flipV="1">
+              <a:off x="4451502" y="3550420"/>
+              <a:ext cx="2572864" cy="834499"/>
+            </a:xfrm>
+            <a:prstGeom prst="bentConnector4">
+              <a:avLst>
+                <a:gd name="adj1" fmla="val -18546"/>
+                <a:gd name="adj2" fmla="val 183777"/>
+              </a:avLst>
+            </a:prstGeom>
+            <a:ln w="12700">
+              <a:solidFill>
+                <a:schemeClr val="tx1"/>
+              </a:solidFill>
+              <a:tailEnd type="triangle"/>
+            </a:ln>
+          </p:spPr>
+          <p:style>
+            <a:lnRef idx="1">
+              <a:schemeClr val="accent1"/>
+            </a:lnRef>
+            <a:fillRef idx="0">
+              <a:schemeClr val="accent1"/>
+            </a:fillRef>
+            <a:effectRef idx="0">
+              <a:schemeClr val="accent1"/>
+            </a:effectRef>
+            <a:fontRef idx="minor">
+              <a:schemeClr val="tx1"/>
+            </a:fontRef>
+          </p:style>
+        </p:cxnSp>
+        <p:sp>
+          <p:nvSpPr>
+            <p:cNvPr id="71" name="Textfeld 70">
+              <a:extLst>
+                <a:ext uri="{FF2B5EF4-FFF2-40B4-BE49-F238E27FC236}">
+                  <a16:creationId xmlns:a16="http://schemas.microsoft.com/office/drawing/2014/main" id="{19DDBBB1-D6A9-04DE-7301-6A339651E523}"/>
+                </a:ext>
+              </a:extLst>
+            </p:cNvPr>
+            <p:cNvSpPr txBox="1"/>
+            <p:nvPr/>
+          </p:nvSpPr>
+          <p:spPr>
+            <a:xfrm flipH="1">
+              <a:off x="3541853" y="2381707"/>
+              <a:ext cx="842046" cy="307777"/>
+            </a:xfrm>
+            <a:prstGeom prst="rect">
+              <a:avLst/>
+            </a:prstGeom>
+            <a:noFill/>
+          </p:spPr>
+          <p:txBody>
+            <a:bodyPr wrap="square" rtlCol="0">
+              <a:spAutoFit/>
+            </a:bodyPr>
+            <a:lstStyle/>
+            <a:p>
+              <a:r>
+                <a:rPr lang="de-DE" sz="1400" dirty="0"/>
+                <a:t>Störung</a:t>
+              </a:r>
+            </a:p>
+          </p:txBody>
+        </p:sp>
+        <p:sp>
+          <p:nvSpPr>
+            <p:cNvPr id="72" name="Textfeld 71">
+              <a:extLst>
+                <a:ext uri="{FF2B5EF4-FFF2-40B4-BE49-F238E27FC236}">
+                  <a16:creationId xmlns:a16="http://schemas.microsoft.com/office/drawing/2014/main" id="{E3EFCF16-4F7C-A3A4-34FC-84780532B25D}"/>
+                </a:ext>
+              </a:extLst>
+            </p:cNvPr>
+            <p:cNvSpPr txBox="1"/>
+            <p:nvPr/>
+          </p:nvSpPr>
+          <p:spPr>
+            <a:xfrm flipH="1">
+              <a:off x="3541853" y="3170898"/>
+              <a:ext cx="842046" cy="307777"/>
+            </a:xfrm>
+            <a:prstGeom prst="rect">
+              <a:avLst/>
+            </a:prstGeom>
+            <a:noFill/>
+          </p:spPr>
+          <p:txBody>
+            <a:bodyPr wrap="square" rtlCol="0">
+              <a:spAutoFit/>
+            </a:bodyPr>
+            <a:lstStyle/>
+            <a:p>
+              <a:r>
+                <a:rPr lang="de-DE" sz="1400" dirty="0"/>
+                <a:t>Störung</a:t>
+              </a:r>
+            </a:p>
+          </p:txBody>
+        </p:sp>
+        <p:cxnSp>
+          <p:nvCxnSpPr>
+            <p:cNvPr id="74" name="Gerade Verbindung mit Pfeil 73">
+              <a:extLst>
+                <a:ext uri="{FF2B5EF4-FFF2-40B4-BE49-F238E27FC236}">
+                  <a16:creationId xmlns:a16="http://schemas.microsoft.com/office/drawing/2014/main" id="{D79BCAFD-B29C-C939-9468-98C323F76A87}"/>
+                </a:ext>
+              </a:extLst>
+            </p:cNvPr>
+            <p:cNvCxnSpPr>
+              <a:cxnSpLocks/>
+              <a:endCxn id="4" idx="0"/>
+            </p:cNvCxnSpPr>
+            <p:nvPr/>
+          </p:nvCxnSpPr>
+          <p:spPr>
+            <a:xfrm>
+              <a:off x="5313137" y="1242874"/>
+              <a:ext cx="7546" cy="456456"/>
+            </a:xfrm>
+            <a:prstGeom prst="straightConnector1">
+              <a:avLst/>
+            </a:prstGeom>
+            <a:ln w="12700">
+              <a:solidFill>
+                <a:schemeClr val="tx1"/>
+              </a:solidFill>
+              <a:tailEnd type="triangle"/>
+            </a:ln>
+          </p:spPr>
+          <p:style>
+            <a:lnRef idx="1">
+              <a:schemeClr val="accent1"/>
+            </a:lnRef>
+            <a:fillRef idx="0">
+              <a:schemeClr val="accent1"/>
+            </a:fillRef>
+            <a:effectRef idx="0">
+              <a:schemeClr val="accent1"/>
+            </a:effectRef>
+            <a:fontRef idx="minor">
+              <a:schemeClr val="tx1"/>
+            </a:fontRef>
+          </p:style>
+        </p:cxnSp>
+        <p:sp>
+          <p:nvSpPr>
+            <p:cNvPr id="75" name="Textfeld 74">
+              <a:extLst>
+                <a:ext uri="{FF2B5EF4-FFF2-40B4-BE49-F238E27FC236}">
+                  <a16:creationId xmlns:a16="http://schemas.microsoft.com/office/drawing/2014/main" id="{9C1BF73B-4DE1-C680-4F25-6C0F55B9714F}"/>
+                </a:ext>
+              </a:extLst>
+            </p:cNvPr>
+            <p:cNvSpPr txBox="1"/>
+            <p:nvPr/>
+          </p:nvSpPr>
+          <p:spPr>
+            <a:xfrm flipH="1">
+              <a:off x="5344294" y="1296121"/>
+              <a:ext cx="842046" cy="307777"/>
+            </a:xfrm>
+            <a:prstGeom prst="rect">
+              <a:avLst/>
+            </a:prstGeom>
+            <a:noFill/>
+          </p:spPr>
+          <p:txBody>
+            <a:bodyPr wrap="square" rtlCol="0">
+              <a:spAutoFit/>
+            </a:bodyPr>
+            <a:lstStyle/>
+            <a:p>
+              <a:r>
+                <a:rPr lang="de-DE" sz="1400" dirty="0" err="1"/>
+                <a:t>Init</a:t>
+              </a:r>
+              <a:endParaRPr lang="de-DE" sz="1400" dirty="0"/>
+            </a:p>
+          </p:txBody>
+        </p:sp>
+        <p:sp>
+          <p:nvSpPr>
+            <p:cNvPr id="80" name="Textfeld 79">
+              <a:extLst>
+                <a:ext uri="{FF2B5EF4-FFF2-40B4-BE49-F238E27FC236}">
+                  <a16:creationId xmlns:a16="http://schemas.microsoft.com/office/drawing/2014/main" id="{1E9AFC92-D8AE-2E01-1B34-1E0C7788C9FD}"/>
+                </a:ext>
+              </a:extLst>
+            </p:cNvPr>
+            <p:cNvSpPr txBox="1"/>
+            <p:nvPr/>
+          </p:nvSpPr>
+          <p:spPr>
+            <a:xfrm flipH="1">
+              <a:off x="3541853" y="3960090"/>
+              <a:ext cx="842046" cy="307777"/>
+            </a:xfrm>
+            <a:prstGeom prst="rect">
+              <a:avLst/>
+            </a:prstGeom>
+            <a:noFill/>
+          </p:spPr>
+          <p:txBody>
+            <a:bodyPr wrap="square" rtlCol="0">
+              <a:spAutoFit/>
+            </a:bodyPr>
+            <a:lstStyle/>
+            <a:p>
+              <a:r>
+                <a:rPr lang="de-DE" sz="1400" dirty="0"/>
+                <a:t>Störung</a:t>
+              </a:r>
+            </a:p>
+          </p:txBody>
+        </p:sp>
+        <p:sp>
+          <p:nvSpPr>
+            <p:cNvPr id="147" name="Rechteck 146">
+              <a:extLst>
+                <a:ext uri="{FF2B5EF4-FFF2-40B4-BE49-F238E27FC236}">
+                  <a16:creationId xmlns:a16="http://schemas.microsoft.com/office/drawing/2014/main" id="{CA265983-3E3F-91B5-7EBB-7E023446B32D}"/>
+                </a:ext>
+              </a:extLst>
+            </p:cNvPr>
+            <p:cNvSpPr/>
+            <p:nvPr/>
+          </p:nvSpPr>
+          <p:spPr>
+            <a:xfrm>
+              <a:off x="4497019" y="4891836"/>
+              <a:ext cx="1669001" cy="372862"/>
+            </a:xfrm>
+            <a:prstGeom prst="rect">
+              <a:avLst/>
+            </a:prstGeom>
+            <a:noFill/>
+            <a:ln w="12700">
+              <a:solidFill>
+                <a:schemeClr val="tx1"/>
+              </a:solidFill>
+            </a:ln>
+          </p:spPr>
+          <p:style>
+            <a:lnRef idx="2">
+              <a:schemeClr val="accent6"/>
+            </a:lnRef>
+            <a:fillRef idx="1">
+              <a:schemeClr val="lt1"/>
+            </a:fillRef>
+            <a:effectRef idx="0">
+              <a:schemeClr val="accent6"/>
+            </a:effectRef>
+            <a:fontRef idx="minor">
+              <a:schemeClr val="dk1"/>
+            </a:fontRef>
+          </p:style>
+          <p:txBody>
+            <a:bodyPr rtlCol="0" anchor="ctr"/>
+            <a:lstStyle/>
+            <a:p>
+              <a:pPr algn="ctr"/>
+              <a:r>
+                <a:rPr lang="de-DE" dirty="0"/>
+                <a:t>GELB</a:t>
+              </a:r>
+            </a:p>
+          </p:txBody>
+        </p:sp>
+        <p:cxnSp>
+          <p:nvCxnSpPr>
+            <p:cNvPr id="150" name="Verbinder: gewinkelt 149">
+              <a:extLst>
+                <a:ext uri="{FF2B5EF4-FFF2-40B4-BE49-F238E27FC236}">
+                  <a16:creationId xmlns:a16="http://schemas.microsoft.com/office/drawing/2014/main" id="{F1874441-B881-63B8-E9B5-AE2CD068D596}"/>
+                </a:ext>
+              </a:extLst>
+            </p:cNvPr>
+            <p:cNvCxnSpPr>
+              <a:cxnSpLocks/>
+              <a:stCxn id="147" idx="1"/>
+              <a:endCxn id="4" idx="1"/>
+            </p:cNvCxnSpPr>
+            <p:nvPr/>
+          </p:nvCxnSpPr>
+          <p:spPr>
+            <a:xfrm rot="10800000">
+              <a:off x="4486183" y="1885761"/>
+              <a:ext cx="10837" cy="3192506"/>
+            </a:xfrm>
+            <a:prstGeom prst="bentConnector3">
+              <a:avLst>
+                <a:gd name="adj1" fmla="val 9709671"/>
+              </a:avLst>
+            </a:prstGeom>
+            <a:ln>
+              <a:tailEnd type="triangle"/>
+            </a:ln>
+          </p:spPr>
+          <p:style>
+            <a:lnRef idx="1">
+              <a:schemeClr val="accent1"/>
+            </a:lnRef>
+            <a:fillRef idx="0">
+              <a:schemeClr val="accent1"/>
+            </a:fillRef>
+            <a:effectRef idx="0">
+              <a:schemeClr val="accent1"/>
+            </a:effectRef>
+            <a:fontRef idx="minor">
+              <a:schemeClr val="tx1"/>
+            </a:fontRef>
+          </p:style>
+        </p:cxnSp>
+        <p:cxnSp>
+          <p:nvCxnSpPr>
+            <p:cNvPr id="154" name="Verbinder: gewinkelt 153">
+              <a:extLst>
+                <a:ext uri="{FF2B5EF4-FFF2-40B4-BE49-F238E27FC236}">
+                  <a16:creationId xmlns:a16="http://schemas.microsoft.com/office/drawing/2014/main" id="{DC36FC2B-F317-6060-2342-27ED89CAD67A}"/>
+                </a:ext>
+              </a:extLst>
+            </p:cNvPr>
+            <p:cNvCxnSpPr>
+              <a:cxnSpLocks/>
+              <a:stCxn id="7" idx="1"/>
+              <a:endCxn id="4" idx="1"/>
+            </p:cNvCxnSpPr>
+            <p:nvPr/>
+          </p:nvCxnSpPr>
+          <p:spPr>
+            <a:xfrm rot="10800000">
+              <a:off x="4486182" y="1885761"/>
+              <a:ext cx="12700" cy="2386432"/>
+            </a:xfrm>
+            <a:prstGeom prst="bentConnector3">
+              <a:avLst>
+                <a:gd name="adj1" fmla="val 8280000"/>
+              </a:avLst>
+            </a:prstGeom>
+            <a:ln>
+              <a:tailEnd type="triangle"/>
+            </a:ln>
+          </p:spPr>
+          <p:style>
+            <a:lnRef idx="1">
+              <a:schemeClr val="accent1"/>
+            </a:lnRef>
+            <a:fillRef idx="0">
+              <a:schemeClr val="accent1"/>
+            </a:fillRef>
+            <a:effectRef idx="0">
+              <a:schemeClr val="accent1"/>
+            </a:effectRef>
+            <a:fontRef idx="minor">
+              <a:schemeClr val="tx1"/>
+            </a:fontRef>
+          </p:style>
+        </p:cxnSp>
+        <p:cxnSp>
+          <p:nvCxnSpPr>
+            <p:cNvPr id="157" name="Verbinder: gewinkelt 156">
+              <a:extLst>
+                <a:ext uri="{FF2B5EF4-FFF2-40B4-BE49-F238E27FC236}">
+                  <a16:creationId xmlns:a16="http://schemas.microsoft.com/office/drawing/2014/main" id="{9DE1021E-B1CE-57B6-70E2-84E86076F8BB}"/>
+                </a:ext>
+              </a:extLst>
+            </p:cNvPr>
+            <p:cNvCxnSpPr>
+              <a:cxnSpLocks/>
+            </p:cNvCxnSpPr>
+            <p:nvPr/>
+          </p:nvCxnSpPr>
+          <p:spPr>
+            <a:xfrm rot="10800000">
+              <a:off x="4501422" y="1885761"/>
+              <a:ext cx="12700" cy="1590954"/>
+            </a:xfrm>
+            <a:prstGeom prst="bentConnector3">
+              <a:avLst>
+                <a:gd name="adj1" fmla="val 8400000"/>
+              </a:avLst>
+            </a:prstGeom>
+            <a:ln>
+              <a:tailEnd type="triangle"/>
+            </a:ln>
+          </p:spPr>
+          <p:style>
+            <a:lnRef idx="1">
+              <a:schemeClr val="accent1"/>
+            </a:lnRef>
+            <a:fillRef idx="0">
+              <a:schemeClr val="accent1"/>
+            </a:fillRef>
+            <a:effectRef idx="0">
+              <a:schemeClr val="accent1"/>
+            </a:effectRef>
+            <a:fontRef idx="minor">
+              <a:schemeClr val="tx1"/>
+            </a:fontRef>
+          </p:style>
+        </p:cxnSp>
+        <p:cxnSp>
+          <p:nvCxnSpPr>
+            <p:cNvPr id="162" name="Verbinder: gewinkelt 161">
+              <a:extLst>
+                <a:ext uri="{FF2B5EF4-FFF2-40B4-BE49-F238E27FC236}">
+                  <a16:creationId xmlns:a16="http://schemas.microsoft.com/office/drawing/2014/main" id="{CAAEFB6D-B687-F7C0-50B4-260DAFDECE54}"/>
+                </a:ext>
+              </a:extLst>
+            </p:cNvPr>
+            <p:cNvCxnSpPr>
+              <a:cxnSpLocks/>
+              <a:stCxn id="5" idx="1"/>
+              <a:endCxn id="4" idx="1"/>
+            </p:cNvCxnSpPr>
+            <p:nvPr/>
+          </p:nvCxnSpPr>
+          <p:spPr>
+            <a:xfrm rot="10800000">
+              <a:off x="4486182" y="1885762"/>
+              <a:ext cx="12700" cy="795477"/>
+            </a:xfrm>
+            <a:prstGeom prst="bentConnector3">
+              <a:avLst>
+                <a:gd name="adj1" fmla="val 8280000"/>
+              </a:avLst>
+            </a:prstGeom>
+            <a:ln>
+              <a:tailEnd type="triangle"/>
+            </a:ln>
+          </p:spPr>
+          <p:style>
+            <a:lnRef idx="1">
+              <a:schemeClr val="accent1"/>
+            </a:lnRef>
+            <a:fillRef idx="0">
+              <a:schemeClr val="accent1"/>
+            </a:fillRef>
+            <a:effectRef idx="0">
+              <a:schemeClr val="accent1"/>
+            </a:effectRef>
+            <a:fontRef idx="minor">
+              <a:schemeClr val="tx1"/>
+            </a:fontRef>
+          </p:style>
+        </p:cxnSp>
+        <p:cxnSp>
+          <p:nvCxnSpPr>
+            <p:cNvPr id="164" name="Verbinder: gewinkelt 163">
+              <a:extLst>
+                <a:ext uri="{FF2B5EF4-FFF2-40B4-BE49-F238E27FC236}">
+                  <a16:creationId xmlns:a16="http://schemas.microsoft.com/office/drawing/2014/main" id="{E277FB0F-A4C5-FF03-50EF-8C90AF1E4052}"/>
+                </a:ext>
+              </a:extLst>
+            </p:cNvPr>
+            <p:cNvCxnSpPr/>
+            <p:nvPr/>
+          </p:nvCxnSpPr>
+          <p:spPr>
+            <a:xfrm rot="10800000">
+              <a:off x="4486181" y="1885761"/>
+              <a:ext cx="10837" cy="3192506"/>
+            </a:xfrm>
+            <a:prstGeom prst="bentConnector3">
+              <a:avLst>
+                <a:gd name="adj1" fmla="val 9709671"/>
+              </a:avLst>
+            </a:prstGeom>
+            <a:ln w="12700">
+              <a:solidFill>
+                <a:schemeClr val="tx1"/>
+              </a:solidFill>
+              <a:tailEnd type="triangle"/>
+            </a:ln>
+          </p:spPr>
+          <p:style>
+            <a:lnRef idx="1">
+              <a:schemeClr val="accent1"/>
+            </a:lnRef>
+            <a:fillRef idx="0">
+              <a:schemeClr val="accent1"/>
+            </a:fillRef>
+            <a:effectRef idx="0">
+              <a:schemeClr val="accent1"/>
+            </a:effectRef>
+            <a:fontRef idx="minor">
+              <a:schemeClr val="tx1"/>
+            </a:fontRef>
+          </p:style>
+        </p:cxnSp>
+        <p:cxnSp>
+          <p:nvCxnSpPr>
+            <p:cNvPr id="165" name="Verbinder: gewinkelt 164">
+              <a:extLst>
+                <a:ext uri="{FF2B5EF4-FFF2-40B4-BE49-F238E27FC236}">
+                  <a16:creationId xmlns:a16="http://schemas.microsoft.com/office/drawing/2014/main" id="{93E26663-E853-3985-4E4E-676333E60886}"/>
+                </a:ext>
+              </a:extLst>
+            </p:cNvPr>
+            <p:cNvCxnSpPr/>
+            <p:nvPr/>
+          </p:nvCxnSpPr>
+          <p:spPr>
+            <a:xfrm rot="10800000">
+              <a:off x="4486180" y="1885761"/>
+              <a:ext cx="12700" cy="2386432"/>
+            </a:xfrm>
+            <a:prstGeom prst="bentConnector3">
+              <a:avLst>
+                <a:gd name="adj1" fmla="val 8280000"/>
+              </a:avLst>
+            </a:prstGeom>
+            <a:ln w="12700">
+              <a:solidFill>
+                <a:schemeClr val="tx1"/>
+              </a:solidFill>
+              <a:tailEnd type="triangle"/>
+            </a:ln>
+          </p:spPr>
+          <p:style>
+            <a:lnRef idx="1">
+              <a:schemeClr val="accent1"/>
+            </a:lnRef>
+            <a:fillRef idx="0">
+              <a:schemeClr val="accent1"/>
+            </a:fillRef>
+            <a:effectRef idx="0">
+              <a:schemeClr val="accent1"/>
+            </a:effectRef>
+            <a:fontRef idx="minor">
+              <a:schemeClr val="tx1"/>
+            </a:fontRef>
+          </p:style>
+        </p:cxnSp>
+        <p:cxnSp>
+          <p:nvCxnSpPr>
+            <p:cNvPr id="166" name="Verbinder: gewinkelt 165">
+              <a:extLst>
+                <a:ext uri="{FF2B5EF4-FFF2-40B4-BE49-F238E27FC236}">
+                  <a16:creationId xmlns:a16="http://schemas.microsoft.com/office/drawing/2014/main" id="{6D961097-C88A-D035-671A-47E173C56A40}"/>
+                </a:ext>
+              </a:extLst>
+            </p:cNvPr>
+            <p:cNvCxnSpPr>
+              <a:cxnSpLocks/>
+            </p:cNvCxnSpPr>
+            <p:nvPr/>
+          </p:nvCxnSpPr>
+          <p:spPr>
+            <a:xfrm rot="10800000">
+              <a:off x="4501420" y="1885761"/>
+              <a:ext cx="12700" cy="1590954"/>
+            </a:xfrm>
+            <a:prstGeom prst="bentConnector3">
+              <a:avLst>
+                <a:gd name="adj1" fmla="val 8400000"/>
+              </a:avLst>
+            </a:prstGeom>
+            <a:ln w="12700">
+              <a:solidFill>
+                <a:schemeClr val="tx1"/>
+              </a:solidFill>
+              <a:tailEnd type="triangle"/>
+            </a:ln>
+          </p:spPr>
+          <p:style>
+            <a:lnRef idx="1">
+              <a:schemeClr val="accent1"/>
+            </a:lnRef>
+            <a:fillRef idx="0">
+              <a:schemeClr val="accent1"/>
+            </a:fillRef>
+            <a:effectRef idx="0">
+              <a:schemeClr val="accent1"/>
+            </a:effectRef>
+            <a:fontRef idx="minor">
+              <a:schemeClr val="tx1"/>
+            </a:fontRef>
+          </p:style>
+        </p:cxnSp>
+        <p:cxnSp>
+          <p:nvCxnSpPr>
+            <p:cNvPr id="167" name="Verbinder: gewinkelt 166">
+              <a:extLst>
+                <a:ext uri="{FF2B5EF4-FFF2-40B4-BE49-F238E27FC236}">
+                  <a16:creationId xmlns:a16="http://schemas.microsoft.com/office/drawing/2014/main" id="{7B717630-F0AD-F8BF-4957-3006C9F8348A}"/>
+                </a:ext>
+              </a:extLst>
+            </p:cNvPr>
+            <p:cNvCxnSpPr/>
+            <p:nvPr/>
+          </p:nvCxnSpPr>
+          <p:spPr>
+            <a:xfrm rot="10800000">
+              <a:off x="4486180" y="1885762"/>
+              <a:ext cx="12700" cy="795477"/>
+            </a:xfrm>
+            <a:prstGeom prst="bentConnector3">
+              <a:avLst>
+                <a:gd name="adj1" fmla="val 8280000"/>
+              </a:avLst>
+            </a:prstGeom>
+            <a:ln w="12700">
+              <a:solidFill>
+                <a:schemeClr val="tx1"/>
+              </a:solidFill>
+              <a:tailEnd type="triangle"/>
+            </a:ln>
+          </p:spPr>
+          <p:style>
+            <a:lnRef idx="1">
+              <a:schemeClr val="accent1"/>
+            </a:lnRef>
+            <a:fillRef idx="0">
+              <a:schemeClr val="accent1"/>
+            </a:fillRef>
+            <a:effectRef idx="0">
+              <a:schemeClr val="accent1"/>
+            </a:effectRef>
+            <a:fontRef idx="minor">
+              <a:schemeClr val="tx1"/>
+            </a:fontRef>
+          </p:style>
+        </p:cxnSp>
+        <p:sp>
+          <p:nvSpPr>
+            <p:cNvPr id="168" name="Textfeld 167">
+              <a:extLst>
+                <a:ext uri="{FF2B5EF4-FFF2-40B4-BE49-F238E27FC236}">
+                  <a16:creationId xmlns:a16="http://schemas.microsoft.com/office/drawing/2014/main" id="{FFE93901-D227-5385-BF93-2D05191A5D91}"/>
+                </a:ext>
+              </a:extLst>
+            </p:cNvPr>
+            <p:cNvSpPr txBox="1"/>
+            <p:nvPr/>
+          </p:nvSpPr>
+          <p:spPr>
+            <a:xfrm flipH="1">
+              <a:off x="3541853" y="4794617"/>
+              <a:ext cx="842046" cy="307777"/>
+            </a:xfrm>
+            <a:prstGeom prst="rect">
+              <a:avLst/>
+            </a:prstGeom>
+            <a:noFill/>
+          </p:spPr>
+          <p:txBody>
+            <a:bodyPr wrap="square" rtlCol="0">
+              <a:spAutoFit/>
+            </a:bodyPr>
+            <a:lstStyle/>
+            <a:p>
+              <a:r>
+                <a:rPr lang="de-DE" sz="1400" dirty="0"/>
+                <a:t>Störung</a:t>
+              </a:r>
+            </a:p>
+          </p:txBody>
+        </p:sp>
+      </p:grpSp>
+      <p:sp>
+        <p:nvSpPr>
+          <p:cNvPr id="2" name="Foliennummernplatzhalter 1">
+            <a:extLst>
+              <a:ext uri="{FF2B5EF4-FFF2-40B4-BE49-F238E27FC236}">
+                <a16:creationId xmlns:a16="http://schemas.microsoft.com/office/drawing/2014/main" id="{DC656E44-6051-3FFF-AD16-5E6924029385}"/>
+              </a:ext>
+            </a:extLst>
+          </p:cNvPr>
+          <p:cNvSpPr>
+            <a:spLocks noGrp="1"/>
+          </p:cNvSpPr>
+          <p:nvPr>
+            <p:ph type="sldNum" sz="quarter" idx="12"/>
+          </p:nvPr>
+        </p:nvSpPr>
+        <p:spPr/>
+        <p:txBody>
+          <a:bodyPr/>
+          <a:lstStyle/>
+          <a:p>
+            <a:fld id="{EFE3AD1A-E46D-4847-9B7D-64FDAF55236B}" type="slidenum">
+              <a:rPr lang="de-DE" smtClean="0"/>
+              <a:t>1</a:t>
+            </a:fld>
+            <a:endParaRPr lang="de-DE"/>
+          </a:p>
+        </p:txBody>
+      </p:sp>
+    </p:spTree>
+    <p:extLst>
+      <p:ext uri="{BB962C8B-B14F-4D97-AF65-F5344CB8AC3E}">
+        <p14:creationId xmlns:p14="http://schemas.microsoft.com/office/powerpoint/2010/main" val="2290151558"/>
+      </p:ext>
+    </p:extLst>
+  </p:cSld>
+  <p:clrMapOvr>
+    <a:masterClrMapping/>
+  </p:clrMapOvr>
+</p:sld>
+</file>
+
+<file path=ppt/slides/slide2.xml><?xml version="1.0" encoding="utf-8"?>
+<p:sld xmlns:a="http://schemas.openxmlformats.org/drawingml/2006/main" xmlns:r="http://schemas.openxmlformats.org/officeDocument/2006/relationships" xmlns:p="http://schemas.openxmlformats.org/presentationml/2006/main">
+  <p:cSld>
+    <p:spTree>
+      <p:nvGrpSpPr>
+        <p:cNvPr id="1" name=""/>
+        <p:cNvGrpSpPr/>
+        <p:nvPr/>
+      </p:nvGrpSpPr>
+      <p:grpSpPr>
+        <a:xfrm>
+          <a:off x="0" y="0"/>
+          <a:ext cx="0" cy="0"/>
+          <a:chOff x="0" y="0"/>
+          <a:chExt cx="0" cy="0"/>
+        </a:xfrm>
+      </p:grpSpPr>
+      <p:grpSp>
+        <p:nvGrpSpPr>
+          <p:cNvPr id="3" name="Gruppieren 2">
+            <a:extLst>
+              <a:ext uri="{FF2B5EF4-FFF2-40B4-BE49-F238E27FC236}">
+                <a16:creationId xmlns:a16="http://schemas.microsoft.com/office/drawing/2014/main" id="{5EA2DAED-B700-0D82-ACDC-BF84F056A50C}"/>
+              </a:ext>
+            </a:extLst>
+          </p:cNvPr>
+          <p:cNvGrpSpPr/>
+          <p:nvPr/>
+        </p:nvGrpSpPr>
+        <p:grpSpPr>
+          <a:xfrm>
+            <a:off x="3541853" y="1242874"/>
+            <a:ext cx="2644487" cy="4505435"/>
+            <a:chOff x="3541853" y="1242874"/>
+            <a:chExt cx="2644487" cy="4505435"/>
+          </a:xfrm>
+        </p:grpSpPr>
+        <p:sp>
+          <p:nvSpPr>
+            <p:cNvPr id="4" name="Rechteck 3">
+              <a:extLst>
+                <a:ext uri="{FF2B5EF4-FFF2-40B4-BE49-F238E27FC236}">
+                  <a16:creationId xmlns:a16="http://schemas.microsoft.com/office/drawing/2014/main" id="{0A0C23EE-3F13-6E41-3B64-B9CF975E05EC}"/>
+                </a:ext>
+              </a:extLst>
+            </p:cNvPr>
+            <p:cNvSpPr/>
+            <p:nvPr/>
+          </p:nvSpPr>
+          <p:spPr>
+            <a:xfrm>
+              <a:off x="4486182" y="1699330"/>
+              <a:ext cx="1669001" cy="372862"/>
+            </a:xfrm>
+            <a:prstGeom prst="rect">
+              <a:avLst/>
+            </a:prstGeom>
+            <a:noFill/>
+            <a:ln w="12700">
+              <a:solidFill>
+                <a:schemeClr val="tx1"/>
+              </a:solidFill>
+            </a:ln>
+          </p:spPr>
+          <p:style>
+            <a:lnRef idx="2">
+              <a:schemeClr val="accent6"/>
+            </a:lnRef>
+            <a:fillRef idx="1">
+              <a:schemeClr val="lt1"/>
+            </a:fillRef>
+            <a:effectRef idx="0">
+              <a:schemeClr val="accent6"/>
+            </a:effectRef>
+            <a:fontRef idx="minor">
+              <a:schemeClr val="dk1"/>
+            </a:fontRef>
+          </p:style>
+          <p:txBody>
+            <a:bodyPr rtlCol="0" anchor="ctr"/>
+            <a:lstStyle/>
+            <a:p>
+              <a:pPr algn="ctr"/>
+              <a:r>
+                <a:rPr lang="de-DE" dirty="0"/>
+                <a:t>GELB_BLINKEN</a:t>
+              </a:r>
+            </a:p>
+          </p:txBody>
+        </p:sp>
+        <p:sp>
+          <p:nvSpPr>
+            <p:cNvPr id="5" name="Rechteck 4">
+              <a:extLst>
+                <a:ext uri="{FF2B5EF4-FFF2-40B4-BE49-F238E27FC236}">
+                  <a16:creationId xmlns:a16="http://schemas.microsoft.com/office/drawing/2014/main" id="{C43AFDF7-6EE0-90C9-BE99-CBBA249790E9}"/>
+                </a:ext>
+              </a:extLst>
+            </p:cNvPr>
+            <p:cNvSpPr/>
+            <p:nvPr/>
+          </p:nvSpPr>
+          <p:spPr>
+            <a:xfrm>
+              <a:off x="4486182" y="2494807"/>
+              <a:ext cx="1669001" cy="372862"/>
+            </a:xfrm>
+            <a:prstGeom prst="rect">
+              <a:avLst/>
+            </a:prstGeom>
+            <a:noFill/>
+            <a:ln w="12700">
+              <a:solidFill>
+                <a:schemeClr val="tx1"/>
+              </a:solidFill>
+            </a:ln>
+          </p:spPr>
+          <p:style>
+            <a:lnRef idx="2">
+              <a:schemeClr val="accent6"/>
+            </a:lnRef>
+            <a:fillRef idx="1">
+              <a:schemeClr val="lt1"/>
+            </a:fillRef>
+            <a:effectRef idx="0">
+              <a:schemeClr val="accent6"/>
+            </a:effectRef>
+            <a:fontRef idx="minor">
+              <a:schemeClr val="dk1"/>
+            </a:fontRef>
+          </p:style>
+          <p:txBody>
+            <a:bodyPr rtlCol="0" anchor="ctr"/>
+            <a:lstStyle/>
+            <a:p>
+              <a:pPr algn="ctr"/>
+              <a:r>
+                <a:rPr lang="de-DE" dirty="0"/>
+                <a:t>ROT</a:t>
+              </a:r>
+            </a:p>
+          </p:txBody>
+        </p:sp>
+        <p:sp>
+          <p:nvSpPr>
+            <p:cNvPr id="6" name="Rechteck 5">
+              <a:extLst>
+                <a:ext uri="{FF2B5EF4-FFF2-40B4-BE49-F238E27FC236}">
+                  <a16:creationId xmlns:a16="http://schemas.microsoft.com/office/drawing/2014/main" id="{B16320A6-F45D-5B10-5957-E80CF0E1A58B}"/>
+                </a:ext>
+              </a:extLst>
+            </p:cNvPr>
+            <p:cNvSpPr/>
+            <p:nvPr/>
+          </p:nvSpPr>
+          <p:spPr>
+            <a:xfrm>
+              <a:off x="4486182" y="3290284"/>
+              <a:ext cx="1669001" cy="372862"/>
+            </a:xfrm>
+            <a:prstGeom prst="rect">
+              <a:avLst/>
+            </a:prstGeom>
+            <a:noFill/>
+            <a:ln w="12700">
+              <a:solidFill>
+                <a:schemeClr val="tx1"/>
+              </a:solidFill>
+            </a:ln>
+          </p:spPr>
+          <p:style>
+            <a:lnRef idx="2">
+              <a:schemeClr val="accent6"/>
+            </a:lnRef>
+            <a:fillRef idx="1">
+              <a:schemeClr val="lt1"/>
+            </a:fillRef>
+            <a:effectRef idx="0">
+              <a:schemeClr val="accent6"/>
+            </a:effectRef>
+            <a:fontRef idx="minor">
+              <a:schemeClr val="dk1"/>
+            </a:fontRef>
+          </p:style>
+          <p:txBody>
+            <a:bodyPr rtlCol="0" anchor="ctr"/>
+            <a:lstStyle/>
+            <a:p>
+              <a:pPr algn="ctr"/>
+              <a:r>
+                <a:rPr lang="de-DE" dirty="0"/>
+                <a:t>ROT_GELB</a:t>
+              </a:r>
+            </a:p>
+          </p:txBody>
+        </p:sp>
+        <p:sp>
+          <p:nvSpPr>
+            <p:cNvPr id="7" name="Rechteck 6">
+              <a:extLst>
+                <a:ext uri="{FF2B5EF4-FFF2-40B4-BE49-F238E27FC236}">
+                  <a16:creationId xmlns:a16="http://schemas.microsoft.com/office/drawing/2014/main" id="{13D93691-6FFC-EAA4-BD56-C1F90322DA6A}"/>
+                </a:ext>
+              </a:extLst>
+            </p:cNvPr>
+            <p:cNvSpPr/>
+            <p:nvPr/>
+          </p:nvSpPr>
+          <p:spPr>
+            <a:xfrm>
+              <a:off x="4486182" y="4085762"/>
+              <a:ext cx="1669001" cy="372862"/>
+            </a:xfrm>
+            <a:prstGeom prst="rect">
+              <a:avLst/>
+            </a:prstGeom>
+            <a:noFill/>
+            <a:ln w="12700">
+              <a:solidFill>
+                <a:schemeClr val="tx1"/>
+              </a:solidFill>
+            </a:ln>
+          </p:spPr>
+          <p:style>
+            <a:lnRef idx="2">
+              <a:schemeClr val="accent6"/>
+            </a:lnRef>
+            <a:fillRef idx="1">
+              <a:schemeClr val="lt1"/>
+            </a:fillRef>
+            <a:effectRef idx="0">
+              <a:schemeClr val="accent6"/>
+            </a:effectRef>
+            <a:fontRef idx="minor">
+              <a:schemeClr val="dk1"/>
+            </a:fontRef>
+          </p:style>
+          <p:txBody>
+            <a:bodyPr rtlCol="0" anchor="ctr"/>
+            <a:lstStyle/>
+            <a:p>
+              <a:pPr algn="ctr"/>
+              <a:r>
+                <a:rPr lang="de-DE" dirty="0"/>
+                <a:t>GRUEN</a:t>
+              </a:r>
+            </a:p>
+          </p:txBody>
+        </p:sp>
+        <p:cxnSp>
+          <p:nvCxnSpPr>
+            <p:cNvPr id="12" name="Gerade Verbindung mit Pfeil 11">
+              <a:extLst>
+                <a:ext uri="{FF2B5EF4-FFF2-40B4-BE49-F238E27FC236}">
+                  <a16:creationId xmlns:a16="http://schemas.microsoft.com/office/drawing/2014/main" id="{5DDB5764-6E60-7AF7-04F7-A64D210A08F1}"/>
+                </a:ext>
+              </a:extLst>
+            </p:cNvPr>
+            <p:cNvCxnSpPr>
+              <a:cxnSpLocks/>
+            </p:cNvCxnSpPr>
+            <p:nvPr/>
+          </p:nvCxnSpPr>
+          <p:spPr>
+            <a:xfrm>
+              <a:off x="5320682" y="2072192"/>
+              <a:ext cx="0" cy="422615"/>
+            </a:xfrm>
+            <a:prstGeom prst="straightConnector1">
+              <a:avLst/>
+            </a:prstGeom>
+            <a:ln w="12700">
+              <a:solidFill>
+                <a:schemeClr val="tx1"/>
+              </a:solidFill>
+              <a:tailEnd type="triangle"/>
+            </a:ln>
+          </p:spPr>
+          <p:style>
+            <a:lnRef idx="1">
+              <a:schemeClr val="accent1"/>
+            </a:lnRef>
+            <a:fillRef idx="0">
+              <a:schemeClr val="accent1"/>
+            </a:fillRef>
+            <a:effectRef idx="0">
+              <a:schemeClr val="accent1"/>
+            </a:effectRef>
+            <a:fontRef idx="minor">
+              <a:schemeClr val="tx1"/>
+            </a:fontRef>
+          </p:style>
+        </p:cxnSp>
+        <p:cxnSp>
+          <p:nvCxnSpPr>
+            <p:cNvPr id="16" name="Gerade Verbindung mit Pfeil 15">
+              <a:extLst>
+                <a:ext uri="{FF2B5EF4-FFF2-40B4-BE49-F238E27FC236}">
+                  <a16:creationId xmlns:a16="http://schemas.microsoft.com/office/drawing/2014/main" id="{C47A4171-F4E2-D6CF-3935-5B5E0F47DC0C}"/>
+                </a:ext>
+              </a:extLst>
+            </p:cNvPr>
+            <p:cNvCxnSpPr>
+              <a:cxnSpLocks/>
+              <a:stCxn id="5" idx="2"/>
+              <a:endCxn id="6" idx="0"/>
+            </p:cNvCxnSpPr>
+            <p:nvPr/>
+          </p:nvCxnSpPr>
+          <p:spPr>
+            <a:xfrm>
+              <a:off x="5320683" y="2867669"/>
+              <a:ext cx="0" cy="422615"/>
+            </a:xfrm>
+            <a:prstGeom prst="straightConnector1">
+              <a:avLst/>
+            </a:prstGeom>
+            <a:ln w="12700">
+              <a:solidFill>
+                <a:schemeClr val="tx1"/>
+              </a:solidFill>
+              <a:tailEnd type="triangle"/>
+            </a:ln>
+          </p:spPr>
+          <p:style>
+            <a:lnRef idx="1">
+              <a:schemeClr val="accent1"/>
+            </a:lnRef>
+            <a:fillRef idx="0">
+              <a:schemeClr val="accent1"/>
+            </a:fillRef>
+            <a:effectRef idx="0">
+              <a:schemeClr val="accent1"/>
+            </a:effectRef>
+            <a:fontRef idx="minor">
+              <a:schemeClr val="tx1"/>
+            </a:fontRef>
+          </p:style>
+        </p:cxnSp>
+        <p:cxnSp>
+          <p:nvCxnSpPr>
+            <p:cNvPr id="38" name="Gerade Verbindung mit Pfeil 37">
+              <a:extLst>
+                <a:ext uri="{FF2B5EF4-FFF2-40B4-BE49-F238E27FC236}">
+                  <a16:creationId xmlns:a16="http://schemas.microsoft.com/office/drawing/2014/main" id="{00C69534-CFF2-C6F5-8D1F-E0EAD0476AEB}"/>
+                </a:ext>
+              </a:extLst>
+            </p:cNvPr>
+            <p:cNvCxnSpPr>
+              <a:cxnSpLocks/>
+              <a:stCxn id="6" idx="2"/>
+              <a:endCxn id="7" idx="0"/>
+            </p:cNvCxnSpPr>
+            <p:nvPr/>
+          </p:nvCxnSpPr>
+          <p:spPr>
+            <a:xfrm>
+              <a:off x="5320683" y="3663146"/>
+              <a:ext cx="0" cy="422616"/>
+            </a:xfrm>
+            <a:prstGeom prst="straightConnector1">
+              <a:avLst/>
+            </a:prstGeom>
+            <a:ln w="12700">
+              <a:solidFill>
+                <a:schemeClr val="tx1"/>
+              </a:solidFill>
+              <a:tailEnd type="triangle"/>
+            </a:ln>
+          </p:spPr>
+          <p:style>
+            <a:lnRef idx="1">
+              <a:schemeClr val="accent1"/>
+            </a:lnRef>
+            <a:fillRef idx="0">
+              <a:schemeClr val="accent1"/>
+            </a:fillRef>
+            <a:effectRef idx="0">
+              <a:schemeClr val="accent1"/>
+            </a:effectRef>
+            <a:fontRef idx="minor">
+              <a:schemeClr val="tx1"/>
+            </a:fontRef>
+          </p:style>
+        </p:cxnSp>
+        <p:cxnSp>
+          <p:nvCxnSpPr>
+            <p:cNvPr id="40" name="Gerade Verbindung mit Pfeil 39">
+              <a:extLst>
+                <a:ext uri="{FF2B5EF4-FFF2-40B4-BE49-F238E27FC236}">
+                  <a16:creationId xmlns:a16="http://schemas.microsoft.com/office/drawing/2014/main" id="{E6CECEC2-7E2F-8FD6-5BAB-35FEE648C28B}"/>
+                </a:ext>
+              </a:extLst>
+            </p:cNvPr>
+            <p:cNvCxnSpPr>
+              <a:cxnSpLocks/>
+              <a:stCxn id="7" idx="2"/>
+            </p:cNvCxnSpPr>
+            <p:nvPr/>
+          </p:nvCxnSpPr>
+          <p:spPr>
+            <a:xfrm>
+              <a:off x="5320683" y="4458624"/>
+              <a:ext cx="1" cy="422616"/>
+            </a:xfrm>
+            <a:prstGeom prst="straightConnector1">
+              <a:avLst/>
+            </a:prstGeom>
+            <a:ln w="12700">
+              <a:solidFill>
+                <a:schemeClr val="tx1"/>
+              </a:solidFill>
+              <a:tailEnd type="triangle"/>
+            </a:ln>
+          </p:spPr>
+          <p:style>
+            <a:lnRef idx="1">
+              <a:schemeClr val="accent1"/>
+            </a:lnRef>
+            <a:fillRef idx="0">
+              <a:schemeClr val="accent1"/>
+            </a:fillRef>
+            <a:effectRef idx="0">
+              <a:schemeClr val="accent1"/>
+            </a:effectRef>
+            <a:fontRef idx="minor">
+              <a:schemeClr val="tx1"/>
+            </a:fontRef>
+          </p:style>
+        </p:cxnSp>
+        <p:sp>
+          <p:nvSpPr>
+            <p:cNvPr id="49" name="Textfeld 48">
+              <a:extLst>
+                <a:ext uri="{FF2B5EF4-FFF2-40B4-BE49-F238E27FC236}">
+                  <a16:creationId xmlns:a16="http://schemas.microsoft.com/office/drawing/2014/main" id="{FB1AB104-2BA7-1514-A445-00B8AE308822}"/>
+                </a:ext>
+              </a:extLst>
+            </p:cNvPr>
+            <p:cNvSpPr txBox="1"/>
+            <p:nvPr/>
+          </p:nvSpPr>
+          <p:spPr>
+            <a:xfrm flipH="1">
+              <a:off x="5313137" y="2112309"/>
+              <a:ext cx="842046" cy="307777"/>
+            </a:xfrm>
+            <a:prstGeom prst="rect">
+              <a:avLst/>
+            </a:prstGeom>
+            <a:noFill/>
+          </p:spPr>
+          <p:txBody>
+            <a:bodyPr wrap="square" rtlCol="0">
+              <a:spAutoFit/>
+            </a:bodyPr>
+            <a:lstStyle/>
+            <a:p>
+              <a:r>
                 <a:rPr lang="de-DE" sz="1400" dirty="0"/>
                 <a:t>Taste1</a:t>
               </a:r>
@@ -4592,10 +6276,39 @@
           </p:txBody>
         </p:sp>
       </p:grpSp>
+      <p:sp>
+        <p:nvSpPr>
+          <p:cNvPr id="2" name="Foliennummernplatzhalter 1">
+            <a:extLst>
+              <a:ext uri="{FF2B5EF4-FFF2-40B4-BE49-F238E27FC236}">
+                <a16:creationId xmlns:a16="http://schemas.microsoft.com/office/drawing/2014/main" id="{2802EFB7-B5BD-09FE-1957-88D7D0B5CD83}"/>
+              </a:ext>
+            </a:extLst>
+          </p:cNvPr>
+          <p:cNvSpPr>
+            <a:spLocks noGrp="1"/>
+          </p:cNvSpPr>
+          <p:nvPr>
+            <p:ph type="sldNum" sz="quarter" idx="12"/>
+          </p:nvPr>
+        </p:nvSpPr>
+        <p:spPr/>
+        <p:txBody>
+          <a:bodyPr/>
+          <a:lstStyle/>
+          <a:p>
+            <a:fld id="{EFE3AD1A-E46D-4847-9B7D-64FDAF55236B}" type="slidenum">
+              <a:rPr lang="de-DE" smtClean="0"/>
+              <a:t>2</a:t>
+            </a:fld>
+            <a:endParaRPr lang="de-DE"/>
+          </a:p>
+        </p:txBody>
+      </p:sp>
     </p:spTree>
     <p:extLst>
       <p:ext uri="{BB962C8B-B14F-4D97-AF65-F5344CB8AC3E}">
-        <p14:creationId xmlns:p14="http://schemas.microsoft.com/office/powerpoint/2010/main" val="2290151558"/>
+        <p14:creationId xmlns:p14="http://schemas.microsoft.com/office/powerpoint/2010/main" val="3862042816"/>
       </p:ext>
     </p:extLst>
   </p:cSld>
@@ -4898,4 +6611,299 @@
     </a:ext>
   </a:extLst>
 </a:theme>
+</file>
+
+<file path=ppt/theme/theme2.xml><?xml version="1.0" encoding="utf-8"?>
+<a:theme xmlns:a="http://schemas.openxmlformats.org/drawingml/2006/main" name="Office">
+  <a:themeElements>
+    <a:clrScheme name="Office">
+      <a:dk1>
+        <a:sysClr val="windowText" lastClr="000000"/>
+      </a:dk1>
+      <a:lt1>
+        <a:sysClr val="window" lastClr="FFFFFF"/>
+      </a:lt1>
+      <a:dk2>
+        <a:srgbClr val="44546A"/>
+      </a:dk2>
+      <a:lt2>
+        <a:srgbClr val="E7E6E6"/>
+      </a:lt2>
+      <a:accent1>
+        <a:srgbClr val="4472C4"/>
+      </a:accent1>
+      <a:accent2>
+        <a:srgbClr val="ED7D31"/>
+      </a:accent2>
+      <a:accent3>
+        <a:srgbClr val="A5A5A5"/>
+      </a:accent3>
+      <a:accent4>
+        <a:srgbClr val="FFC000"/>
+      </a:accent4>
+      <a:accent5>
+        <a:srgbClr val="5B9BD5"/>
+      </a:accent5>
+      <a:accent6>
+        <a:srgbClr val="70AD47"/>
+      </a:accent6>
+      <a:hlink>
+        <a:srgbClr val="0563C1"/>
+      </a:hlink>
+      <a:folHlink>
+        <a:srgbClr val="954F72"/>
+      </a:folHlink>
+    </a:clrScheme>
+    <a:fontScheme name="Office">
+      <a:majorFont>
+        <a:latin typeface="Calibri Light" panose="020F0302020204030204"/>
+        <a:ea typeface=""/>
+        <a:cs typeface=""/>
+        <a:font script="Jpan" typeface="游ゴシック Light"/>
+        <a:font script="Hang" typeface="맑은 고딕"/>
+        <a:font script="Hans" typeface="等线 Light"/>
+        <a:font script="Hant" typeface="新細明體"/>
+        <a:font script="Arab" typeface="Times New Roman"/>
+        <a:font script="Hebr" typeface="Times New Roman"/>
+        <a:font script="Thai" typeface="Angsana New"/>
+        <a:font script="Ethi" typeface="Nyala"/>
+        <a:font script="Beng" typeface="Vrinda"/>
+        <a:font script="Gujr" typeface="Shruti"/>
+        <a:font script="Khmr" typeface="MoolBoran"/>
+        <a:font script="Knda" typeface="Tunga"/>
+        <a:font script="Guru" typeface="Raavi"/>
+        <a:font script="Cans" typeface="Euphemia"/>
+        <a:font script="Cher" typeface="Plantagenet Cherokee"/>
+        <a:font script="Yiii" typeface="Microsoft Yi Baiti"/>
+        <a:font script="Tibt" typeface="Microsoft Himalaya"/>
+        <a:font script="Thaa" typeface="MV Boli"/>
+        <a:font script="Deva" typeface="Mangal"/>
+        <a:font script="Telu" typeface="Gautami"/>
+        <a:font script="Taml" typeface="Latha"/>
+        <a:font script="Syrc" typeface="Estrangelo Edessa"/>
+        <a:font script="Orya" typeface="Kalinga"/>
+        <a:font script="Mlym" typeface="Kartika"/>
+        <a:font script="Laoo" typeface="DokChampa"/>
+        <a:font script="Sinh" typeface="Iskoola Pota"/>
+        <a:font script="Mong" typeface="Mongolian Baiti"/>
+        <a:font script="Viet" typeface="Times New Roman"/>
+        <a:font script="Uigh" typeface="Microsoft Uighur"/>
+        <a:font script="Geor" typeface="Sylfaen"/>
+        <a:font script="Armn" typeface="Arial"/>
+        <a:font script="Bugi" typeface="Leelawadee UI"/>
+        <a:font script="Bopo" typeface="Microsoft JhengHei"/>
+        <a:font script="Java" typeface="Javanese Text"/>
+        <a:font script="Lisu" typeface="Segoe UI"/>
+        <a:font script="Mymr" typeface="Myanmar Text"/>
+        <a:font script="Nkoo" typeface="Ebrima"/>
+        <a:font script="Olck" typeface="Nirmala UI"/>
+        <a:font script="Osma" typeface="Ebrima"/>
+        <a:font script="Phag" typeface="Phagspa"/>
+        <a:font script="Syrn" typeface="Estrangelo Edessa"/>
+        <a:font script="Syrj" typeface="Estrangelo Edessa"/>
+        <a:font script="Syre" typeface="Estrangelo Edessa"/>
+        <a:font script="Sora" typeface="Nirmala UI"/>
+        <a:font script="Tale" typeface="Microsoft Tai Le"/>
+        <a:font script="Talu" typeface="Microsoft New Tai Lue"/>
+        <a:font script="Tfng" typeface="Ebrima"/>
+      </a:majorFont>
+      <a:minorFont>
+        <a:latin typeface="Calibri" panose="020F0502020204030204"/>
+        <a:ea typeface=""/>
+        <a:cs typeface=""/>
+        <a:font script="Jpan" typeface="游ゴシック"/>
+        <a:font script="Hang" typeface="맑은 고딕"/>
+        <a:font script="Hans" typeface="等线"/>
+        <a:font script="Hant" typeface="新細明體"/>
+        <a:font script="Arab" typeface="Arial"/>
+        <a:font script="Hebr" typeface="Arial"/>
+        <a:font script="Thai" typeface="Cordia New"/>
+        <a:font script="Ethi" typeface="Nyala"/>
+        <a:font script="Beng" typeface="Vrinda"/>
+        <a:font script="Gujr" typeface="Shruti"/>
+        <a:font script="Khmr" typeface="DaunPenh"/>
+        <a:font script="Knda" typeface="Tunga"/>
+        <a:font script="Guru" typeface="Raavi"/>
+        <a:font script="Cans" typeface="Euphemia"/>
+        <a:font script="Cher" typeface="Plantagenet Cherokee"/>
+        <a:font script="Yiii" typeface="Microsoft Yi Baiti"/>
+        <a:font script="Tibt" typeface="Microsoft Himalaya"/>
+        <a:font script="Thaa" typeface="MV Boli"/>
+        <a:font script="Deva" typeface="Mangal"/>
+        <a:font script="Telu" typeface="Gautami"/>
+        <a:font script="Taml" typeface="Latha"/>
+        <a:font script="Syrc" typeface="Estrangelo Edessa"/>
+        <a:font script="Orya" typeface="Kalinga"/>
+        <a:font script="Mlym" typeface="Kartika"/>
+        <a:font script="Laoo" typeface="DokChampa"/>
+        <a:font script="Sinh" typeface="Iskoola Pota"/>
+        <a:font script="Mong" typeface="Mongolian Baiti"/>
+        <a:font script="Viet" typeface="Arial"/>
+        <a:font script="Uigh" typeface="Microsoft Uighur"/>
+        <a:font script="Geor" typeface="Sylfaen"/>
+        <a:font script="Armn" typeface="Arial"/>
+        <a:font script="Bugi" typeface="Leelawadee UI"/>
+        <a:font script="Bopo" typeface="Microsoft JhengHei"/>
+        <a:font script="Java" typeface="Javanese Text"/>
+        <a:font script="Lisu" typeface="Segoe UI"/>
+        <a:font script="Mymr" typeface="Myanmar Text"/>
+        <a:font script="Nkoo" typeface="Ebrima"/>
+        <a:font script="Olck" typeface="Nirmala UI"/>
+        <a:font script="Osma" typeface="Ebrima"/>
+        <a:font script="Phag" typeface="Phagspa"/>
+        <a:font script="Syrn" typeface="Estrangelo Edessa"/>
+        <a:font script="Syrj" typeface="Estrangelo Edessa"/>
+        <a:font script="Syre" typeface="Estrangelo Edessa"/>
+        <a:font script="Sora" typeface="Nirmala UI"/>
+        <a:font script="Tale" typeface="Microsoft Tai Le"/>
+        <a:font script="Talu" typeface="Microsoft New Tai Lue"/>
+        <a:font script="Tfng" typeface="Ebrima"/>
+      </a:minorFont>
+    </a:fontScheme>
+    <a:fmtScheme name="Office">
+      <a:fillStyleLst>
+        <a:solidFill>
+          <a:schemeClr val="phClr"/>
+        </a:solidFill>
+        <a:gradFill rotWithShape="1">
+          <a:gsLst>
+            <a:gs pos="0">
+              <a:schemeClr val="phClr">
+                <a:lumMod val="110000"/>
+                <a:satMod val="105000"/>
+                <a:tint val="67000"/>
+              </a:schemeClr>
+            </a:gs>
+            <a:gs pos="50000">
+              <a:schemeClr val="phClr">
+                <a:lumMod val="105000"/>
+                <a:satMod val="103000"/>
+                <a:tint val="73000"/>
+              </a:schemeClr>
+            </a:gs>
+            <a:gs pos="100000">
+              <a:schemeClr val="phClr">
+                <a:lumMod val="105000"/>
+                <a:satMod val="109000"/>
+                <a:tint val="81000"/>
+              </a:schemeClr>
+            </a:gs>
+          </a:gsLst>
+          <a:lin ang="5400000" scaled="0"/>
+        </a:gradFill>
+        <a:gradFill rotWithShape="1">
+          <a:gsLst>
+            <a:gs pos="0">
+              <a:schemeClr val="phClr">
+                <a:satMod val="103000"/>
+                <a:lumMod val="102000"/>
+                <a:tint val="94000"/>
+              </a:schemeClr>
+            </a:gs>
+            <a:gs pos="50000">
+              <a:schemeClr val="phClr">
+                <a:satMod val="110000"/>
+                <a:lumMod val="100000"/>
+                <a:shade val="100000"/>
+              </a:schemeClr>
+            </a:gs>
+            <a:gs pos="100000">
+              <a:schemeClr val="phClr">
+                <a:lumMod val="99000"/>
+                <a:satMod val="120000"/>
+                <a:shade val="78000"/>
+              </a:schemeClr>
+            </a:gs>
+          </a:gsLst>
+          <a:lin ang="5400000" scaled="0"/>
+        </a:gradFill>
+      </a:fillStyleLst>
+      <a:lnStyleLst>
+        <a:ln w="6350" cap="flat" cmpd="sng" algn="ctr">
+          <a:solidFill>
+            <a:schemeClr val="phClr"/>
+          </a:solidFill>
+          <a:prstDash val="solid"/>
+          <a:miter lim="800000"/>
+        </a:ln>
+        <a:ln w="12700" cap="flat" cmpd="sng" algn="ctr">
+          <a:solidFill>
+            <a:schemeClr val="phClr"/>
+          </a:solidFill>
+          <a:prstDash val="solid"/>
+          <a:miter lim="800000"/>
+        </a:ln>
+        <a:ln w="19050" cap="flat" cmpd="sng" algn="ctr">
+          <a:solidFill>
+            <a:schemeClr val="phClr"/>
+          </a:solidFill>
+          <a:prstDash val="solid"/>
+          <a:miter lim="800000"/>
+        </a:ln>
+      </a:lnStyleLst>
+      <a:effectStyleLst>
+        <a:effectStyle>
+          <a:effectLst/>
+        </a:effectStyle>
+        <a:effectStyle>
+          <a:effectLst/>
+        </a:effectStyle>
+        <a:effectStyle>
+          <a:effectLst>
+            <a:outerShdw blurRad="57150" dist="19050" dir="5400000" algn="ctr" rotWithShape="0">
+              <a:srgbClr val="000000">
+                <a:alpha val="63000"/>
+              </a:srgbClr>
+            </a:outerShdw>
+          </a:effectLst>
+        </a:effectStyle>
+      </a:effectStyleLst>
+      <a:bgFillStyleLst>
+        <a:solidFill>
+          <a:schemeClr val="phClr"/>
+        </a:solidFill>
+        <a:solidFill>
+          <a:schemeClr val="phClr">
+            <a:tint val="95000"/>
+            <a:satMod val="170000"/>
+          </a:schemeClr>
+        </a:solidFill>
+        <a:gradFill rotWithShape="1">
+          <a:gsLst>
+            <a:gs pos="0">
+              <a:schemeClr val="phClr">
+                <a:tint val="93000"/>
+                <a:satMod val="150000"/>
+                <a:shade val="98000"/>
+                <a:lumMod val="102000"/>
+              </a:schemeClr>
+            </a:gs>
+            <a:gs pos="50000">
+              <a:schemeClr val="phClr">
+                <a:tint val="98000"/>
+                <a:satMod val="130000"/>
+                <a:shade val="90000"/>
+                <a:lumMod val="103000"/>
+              </a:schemeClr>
+            </a:gs>
+            <a:gs pos="100000">
+              <a:schemeClr val="phClr">
+                <a:shade val="63000"/>
+                <a:satMod val="120000"/>
+              </a:schemeClr>
+            </a:gs>
+          </a:gsLst>
+          <a:lin ang="5400000" scaled="0"/>
+        </a:gradFill>
+      </a:bgFillStyleLst>
+    </a:fmtScheme>
+  </a:themeElements>
+  <a:objectDefaults/>
+  <a:extraClrSchemeLst/>
+  <a:extLst>
+    <a:ext uri="{05A4C25C-085E-4340-85A3-A5531E510DB2}">
+      <thm15:themeFamily xmlns:thm15="http://schemas.microsoft.com/office/thememl/2012/main" name="Office Theme" id="{62F939B6-93AF-4DB8-9C6B-D6C7DFDC589F}" vid="{4A3C46E8-61CC-4603-A589-7422A47A8E4A}"/>
+    </a:ext>
+  </a:extLst>
+</a:theme>
 </file>
</xml_diff>